<commit_message>
minor tweak to presentation.
</commit_message>
<xml_diff>
--- a/Presentation.pptx
+++ b/Presentation.pptx
@@ -127,10 +127,6 @@
 </p:presentation>
 </file>
 
-<file path=ppt/revisionInfo.xml><?xml version="1.0" encoding="utf-8"?>
-<p1510:revInfo xmlns:a="http://schemas.openxmlformats.org/drawingml/2006/main" xmlns:r="http://schemas.openxmlformats.org/officeDocument/2006/relationships" xmlns:p1510="http://schemas.microsoft.com/office/powerpoint/2015/10/main"/>
-</file>
-
 <file path=ppt/handoutMasters/handoutMaster1.xml><?xml version="1.0" encoding="utf-8"?>
 <p:handoutMaster xmlns:a="http://schemas.openxmlformats.org/drawingml/2006/main" xmlns:r="http://schemas.openxmlformats.org/officeDocument/2006/relationships" xmlns:p="http://schemas.openxmlformats.org/presentationml/2006/main">
   <p:cSld>
@@ -225,7 +221,7 @@
           <a:p>
             <a:fld id="{C15ADFAC-2648-4B78-AF08-855E0FCF74BA}" type="datetimeFigureOut">
               <a:rPr lang="en-US" smtClean="0"/>
-              <a:t>4/6/2018</a:t>
+              <a:t>4/12/2018</a:t>
             </a:fld>
             <a:endParaRPr lang="en-US"/>
           </a:p>
@@ -402,7 +398,7 @@
           <a:p>
             <a:fld id="{2DF64246-339A-44D9-BE42-15BE7215FEEA}" type="datetimeFigureOut">
               <a:rPr lang="en-US" smtClean="0"/>
-              <a:t>4/1/2018</a:t>
+              <a:t>4/12/2018</a:t>
             </a:fld>
             <a:endParaRPr lang="en-US"/>
           </a:p>
@@ -4817,7 +4813,7 @@
           <a:p>
             <a:pPr marL="0" indent="0">
               <a:lnSpc>
-                <a:spcPct val="200000"/>
+                <a:spcPct val="100000"/>
               </a:lnSpc>
               <a:spcBef>
                 <a:spcPts val="0"/>
@@ -4835,7 +4831,7 @@
           <a:p>
             <a:pPr marL="0" indent="0">
               <a:lnSpc>
-                <a:spcPct val="200000"/>
+                <a:spcPct val="100000"/>
               </a:lnSpc>
               <a:spcBef>
                 <a:spcPts val="0"/>
@@ -4847,8 +4843,62 @@
               <a:rPr lang="en-US" dirty="0">
                 <a:latin typeface="Lucida Console" panose="020B0609040504020204" pitchFamily="49" charset="0"/>
               </a:rPr>
+              <a:t>@</a:t>
+            </a:r>
+            <a:r>
+              <a:rPr lang="en-US" dirty="0" err="1">
+                <a:latin typeface="Lucida Console" panose="020B0609040504020204" pitchFamily="49" charset="0"/>
+              </a:rPr>
+              <a:t>markdomansky</a:t>
+            </a:r>
+            <a:endParaRPr lang="en-US" dirty="0">
+              <a:latin typeface="Lucida Console" panose="020B0609040504020204" pitchFamily="49" charset="0"/>
+            </a:endParaRPr>
+          </a:p>
+          <a:p>
+            <a:pPr marL="0" indent="0">
+              <a:lnSpc>
+                <a:spcPct val="100000"/>
+              </a:lnSpc>
+              <a:spcBef>
+                <a:spcPts val="0"/>
+              </a:spcBef>
+              <a:buFont typeface="Arial"/>
+              <a:buNone/>
+            </a:pPr>
+            <a:r>
+              <a:rPr lang="en-US" dirty="0">
+                <a:latin typeface="Lucida Console" panose="020B0609040504020204" pitchFamily="49" charset="0"/>
+              </a:rPr>
               <a:t>markdomansky@gmail.com</a:t>
             </a:r>
+          </a:p>
+          <a:p>
+            <a:pPr marL="0" indent="0">
+              <a:lnSpc>
+                <a:spcPct val="100000"/>
+              </a:lnSpc>
+              <a:spcBef>
+                <a:spcPts val="0"/>
+              </a:spcBef>
+              <a:buFont typeface="Arial"/>
+              <a:buNone/>
+            </a:pPr>
+            <a:r>
+              <a:rPr lang="en-US" dirty="0">
+                <a:latin typeface="Lucida Console" panose="020B0609040504020204" pitchFamily="49" charset="0"/>
+              </a:rPr>
+              <a:t>/in/</a:t>
+            </a:r>
+            <a:r>
+              <a:rPr lang="en-US" dirty="0" err="1">
+                <a:latin typeface="Lucida Console" panose="020B0609040504020204" pitchFamily="49" charset="0"/>
+              </a:rPr>
+              <a:t>markdomansky</a:t>
+            </a:r>
+            <a:endParaRPr lang="en-US" dirty="0">
+              <a:latin typeface="Lucida Console" panose="020B0609040504020204" pitchFamily="49" charset="0"/>
+            </a:endParaRPr>
           </a:p>
         </p:txBody>
       </p:sp>

</xml_diff>